<commit_message>
Wurzburg NMF talk slides update
</commit_message>
<xml_diff>
--- a/NMF for Digital Humanities - University of Wurzburg - Jonathan Armoza.pptx
+++ b/NMF for Digital Humanities - University of Wurzburg - Jonathan Armoza.pptx
@@ -5,7 +5,7 @@
     <p:sldMasterId id="2147483708" r:id="rId1"/>
   </p:sldMasterIdLst>
   <p:notesMasterIdLst>
-    <p:notesMasterId r:id="rId38"/>
+    <p:notesMasterId r:id="rId39"/>
   </p:notesMasterIdLst>
   <p:sldIdLst>
     <p:sldId id="256" r:id="rId2"/>
@@ -43,7 +43,8 @@
     <p:sldId id="280" r:id="rId34"/>
     <p:sldId id="294" r:id="rId35"/>
     <p:sldId id="296" r:id="rId36"/>
-    <p:sldId id="277" r:id="rId37"/>
+    <p:sldId id="297" r:id="rId37"/>
+    <p:sldId id="277" r:id="rId38"/>
   </p:sldIdLst>
   <p:sldSz cx="12192000" cy="6858000"/>
   <p:notesSz cx="6858000" cy="9144000"/>
@@ -11598,6 +11599,699 @@
 </file>
 
 <file path=ppt/slides/slide36.xml><?xml version="1.0" encoding="utf-8"?>
+<p:sld xmlns:a="http://schemas.openxmlformats.org/drawingml/2006/main" xmlns:r="http://schemas.openxmlformats.org/officeDocument/2006/relationships" xmlns:p="http://schemas.openxmlformats.org/presentationml/2006/main">
+  <p:cSld>
+    <p:spTree>
+      <p:nvGrpSpPr>
+        <p:cNvPr id="1" name=""/>
+        <p:cNvGrpSpPr/>
+        <p:nvPr/>
+      </p:nvGrpSpPr>
+      <p:grpSpPr>
+        <a:xfrm>
+          <a:off x="0" y="0"/>
+          <a:ext cx="0" cy="0"/>
+          <a:chOff x="0" y="0"/>
+          <a:chExt cx="0" cy="0"/>
+        </a:xfrm>
+      </p:grpSpPr>
+      <p:sp>
+        <p:nvSpPr>
+          <p:cNvPr id="3" name="Content Placeholder 2">
+            <a:extLst>
+              <a:ext uri="{FF2B5EF4-FFF2-40B4-BE49-F238E27FC236}">
+                <a16:creationId xmlns:a16="http://schemas.microsoft.com/office/drawing/2014/main" id="{70541728-AFDA-4640-A21E-470A9F671AA3}"/>
+              </a:ext>
+            </a:extLst>
+          </p:cNvPr>
+          <p:cNvSpPr>
+            <a:spLocks noGrp="1"/>
+          </p:cNvSpPr>
+          <p:nvPr>
+            <p:ph idx="1"/>
+          </p:nvPr>
+        </p:nvSpPr>
+        <p:spPr>
+          <a:xfrm>
+            <a:off x="838200" y="556059"/>
+            <a:ext cx="5377249" cy="5892758"/>
+          </a:xfrm>
+        </p:spPr>
+        <p:txBody>
+          <a:bodyPr>
+            <a:normAutofit fontScale="92500" lnSpcReduction="20000"/>
+          </a:bodyPr>
+          <a:lstStyle/>
+          <a:p>
+            <a:pPr marL="0" indent="0">
+              <a:buNone/>
+            </a:pPr>
+            <a:r>
+              <a:rPr lang="en-CA" dirty="0"/>
+              <a:t>I felt a </a:t>
+            </a:r>
+            <a:r>
+              <a:rPr lang="en-CA" dirty="0">
+                <a:solidFill>
+                  <a:srgbClr val="FF40FF"/>
+                </a:solidFill>
+              </a:rPr>
+              <a:t>Funeral</a:t>
+            </a:r>
+            <a:r>
+              <a:rPr lang="en-CA" dirty="0"/>
+              <a:t>, in my </a:t>
+            </a:r>
+            <a:r>
+              <a:rPr lang="en-CA" dirty="0">
+                <a:solidFill>
+                  <a:srgbClr val="00B050"/>
+                </a:solidFill>
+              </a:rPr>
+              <a:t>Brain</a:t>
+            </a:r>
+            <a:r>
+              <a:rPr lang="en-CA" dirty="0"/>
+              <a:t>,</a:t>
+            </a:r>
+          </a:p>
+          <a:p>
+            <a:pPr marL="0" indent="0">
+              <a:buNone/>
+            </a:pPr>
+            <a:r>
+              <a:rPr lang="en-CA" dirty="0"/>
+              <a:t>And </a:t>
+            </a:r>
+            <a:r>
+              <a:rPr lang="en-CA" dirty="0">
+                <a:solidFill>
+                  <a:srgbClr val="FF40FF"/>
+                </a:solidFill>
+              </a:rPr>
+              <a:t>Mourners</a:t>
+            </a:r>
+            <a:r>
+              <a:rPr lang="en-CA" dirty="0"/>
+              <a:t> to and </a:t>
+            </a:r>
+            <a:r>
+              <a:rPr lang="en-CA" dirty="0" err="1"/>
+              <a:t>fro</a:t>
+            </a:r>
+            <a:endParaRPr lang="en-CA" dirty="0"/>
+          </a:p>
+          <a:p>
+            <a:pPr marL="0" indent="0">
+              <a:buNone/>
+            </a:pPr>
+            <a:r>
+              <a:rPr lang="en-CA" dirty="0"/>
+              <a:t>Kept treading - treading - till it seemed</a:t>
+            </a:r>
+          </a:p>
+          <a:p>
+            <a:pPr marL="0" indent="0">
+              <a:buNone/>
+            </a:pPr>
+            <a:r>
+              <a:rPr lang="en-CA" dirty="0"/>
+              <a:t>That </a:t>
+            </a:r>
+            <a:r>
+              <a:rPr lang="en-CA" dirty="0">
+                <a:solidFill>
+                  <a:srgbClr val="00B050"/>
+                </a:solidFill>
+              </a:rPr>
+              <a:t>Sense</a:t>
+            </a:r>
+            <a:r>
+              <a:rPr lang="en-CA" dirty="0"/>
+              <a:t> </a:t>
+            </a:r>
+            <a:r>
+              <a:rPr lang="en-CA" dirty="0">
+                <a:solidFill>
+                  <a:srgbClr val="00B050"/>
+                </a:solidFill>
+              </a:rPr>
+              <a:t>was breaking through </a:t>
+            </a:r>
+            <a:r>
+              <a:rPr lang="en-CA" dirty="0"/>
+              <a:t>-</a:t>
+            </a:r>
+          </a:p>
+          <a:p>
+            <a:pPr marL="0" indent="0">
+              <a:buNone/>
+            </a:pPr>
+            <a:endParaRPr lang="en-CA" dirty="0"/>
+          </a:p>
+          <a:p>
+            <a:pPr marL="0" indent="0">
+              <a:buNone/>
+            </a:pPr>
+            <a:r>
+              <a:rPr lang="en-CA" dirty="0"/>
+              <a:t>And when they </a:t>
+            </a:r>
+            <a:r>
+              <a:rPr lang="en-CA" dirty="0">
+                <a:solidFill>
+                  <a:srgbClr val="FF40FF"/>
+                </a:solidFill>
+              </a:rPr>
+              <a:t>all were seated</a:t>
+            </a:r>
+            <a:r>
+              <a:rPr lang="en-CA" dirty="0"/>
+              <a:t>,</a:t>
+            </a:r>
+          </a:p>
+          <a:p>
+            <a:pPr marL="0" indent="0">
+              <a:buNone/>
+            </a:pPr>
+            <a:r>
+              <a:rPr lang="en-CA" dirty="0"/>
+              <a:t>A </a:t>
+            </a:r>
+            <a:r>
+              <a:rPr lang="en-CA" dirty="0">
+                <a:solidFill>
+                  <a:srgbClr val="FF40FF"/>
+                </a:solidFill>
+              </a:rPr>
+              <a:t>Service</a:t>
+            </a:r>
+            <a:r>
+              <a:rPr lang="en-CA" dirty="0"/>
+              <a:t>, like a Drum -</a:t>
+            </a:r>
+          </a:p>
+          <a:p>
+            <a:pPr marL="0" indent="0">
+              <a:buNone/>
+            </a:pPr>
+            <a:r>
+              <a:rPr lang="en-CA" dirty="0"/>
+              <a:t>Kept beating - beating - till </a:t>
+            </a:r>
+            <a:r>
+              <a:rPr lang="en-CA" dirty="0">
+                <a:solidFill>
+                  <a:srgbClr val="00B050"/>
+                </a:solidFill>
+              </a:rPr>
+              <a:t>I thought</a:t>
+            </a:r>
+          </a:p>
+          <a:p>
+            <a:pPr marL="0" indent="0">
+              <a:buNone/>
+            </a:pPr>
+            <a:r>
+              <a:rPr lang="en-CA" dirty="0">
+                <a:solidFill>
+                  <a:srgbClr val="00B050"/>
+                </a:solidFill>
+              </a:rPr>
+              <a:t>My mind was going numb</a:t>
+            </a:r>
+            <a:r>
+              <a:rPr lang="en-CA" dirty="0"/>
+              <a:t> -</a:t>
+            </a:r>
+          </a:p>
+          <a:p>
+            <a:pPr marL="0" indent="0">
+              <a:buNone/>
+            </a:pPr>
+            <a:endParaRPr lang="en-CA" dirty="0"/>
+          </a:p>
+          <a:p>
+            <a:pPr marL="0" indent="0">
+              <a:buNone/>
+            </a:pPr>
+            <a:r>
+              <a:rPr lang="en-CA" dirty="0"/>
+              <a:t>And then </a:t>
+            </a:r>
+            <a:r>
+              <a:rPr lang="en-CA" dirty="0">
+                <a:solidFill>
+                  <a:srgbClr val="00B050"/>
+                </a:solidFill>
+              </a:rPr>
+              <a:t>I heard</a:t>
+            </a:r>
+            <a:r>
+              <a:rPr lang="en-CA" dirty="0"/>
+              <a:t> them lift </a:t>
+            </a:r>
+            <a:r>
+              <a:rPr lang="en-CA" dirty="0">
+                <a:solidFill>
+                  <a:srgbClr val="FF40FF"/>
+                </a:solidFill>
+              </a:rPr>
+              <a:t>a Box</a:t>
+            </a:r>
+          </a:p>
+          <a:p>
+            <a:pPr marL="0" indent="0">
+              <a:buNone/>
+            </a:pPr>
+            <a:r>
+              <a:rPr lang="en-CA" dirty="0"/>
+              <a:t>And </a:t>
+            </a:r>
+            <a:r>
+              <a:rPr lang="en-CA" dirty="0">
+                <a:solidFill>
+                  <a:srgbClr val="FF40FF"/>
+                </a:solidFill>
+              </a:rPr>
+              <a:t>creak across my Soul</a:t>
+            </a:r>
+          </a:p>
+          <a:p>
+            <a:pPr marL="0" indent="0">
+              <a:buNone/>
+            </a:pPr>
+            <a:r>
+              <a:rPr lang="en-CA" dirty="0"/>
+              <a:t>With those same Boots of Lead, again,</a:t>
+            </a:r>
+          </a:p>
+          <a:p>
+            <a:pPr marL="0" indent="0">
+              <a:buNone/>
+            </a:pPr>
+            <a:r>
+              <a:rPr lang="en-CA" dirty="0"/>
+              <a:t>Then </a:t>
+            </a:r>
+            <a:r>
+              <a:rPr lang="en-CA" dirty="0">
+                <a:solidFill>
+                  <a:srgbClr val="FF40FF"/>
+                </a:solidFill>
+              </a:rPr>
+              <a:t>Space - began to toll</a:t>
+            </a:r>
+            <a:r>
+              <a:rPr lang="en-CA" dirty="0"/>
+              <a:t>,</a:t>
+            </a:r>
+          </a:p>
+          <a:p>
+            <a:pPr marL="0" indent="0">
+              <a:buNone/>
+            </a:pPr>
+            <a:endParaRPr lang="en-CA" dirty="0"/>
+          </a:p>
+        </p:txBody>
+      </p:sp>
+      <p:sp>
+        <p:nvSpPr>
+          <p:cNvPr id="4" name="Content Placeholder 2">
+            <a:extLst>
+              <a:ext uri="{FF2B5EF4-FFF2-40B4-BE49-F238E27FC236}">
+                <a16:creationId xmlns:a16="http://schemas.microsoft.com/office/drawing/2014/main" id="{5B77E08B-41BD-0544-9A23-742B07B78B0E}"/>
+              </a:ext>
+            </a:extLst>
+          </p:cNvPr>
+          <p:cNvSpPr txBox="1">
+            <a:spLocks/>
+          </p:cNvSpPr>
+          <p:nvPr/>
+        </p:nvSpPr>
+        <p:spPr>
+          <a:xfrm>
+            <a:off x="6215449" y="556059"/>
+            <a:ext cx="5377249" cy="5892758"/>
+          </a:xfrm>
+          <a:prstGeom prst="rect">
+            <a:avLst/>
+          </a:prstGeom>
+        </p:spPr>
+        <p:txBody>
+          <a:bodyPr vert="horz" lIns="91440" tIns="45720" rIns="91440" bIns="45720" rtlCol="0">
+            <a:normAutofit/>
+          </a:bodyPr>
+          <a:lstStyle>
+            <a:lvl1pPr marL="228600" indent="-228600" algn="l" defTabSz="914400" rtl="0" eaLnBrk="1" latinLnBrk="0" hangingPunct="1">
+              <a:lnSpc>
+                <a:spcPct val="90000"/>
+              </a:lnSpc>
+              <a:spcBef>
+                <a:spcPts val="1000"/>
+              </a:spcBef>
+              <a:buFont typeface="Arial"/>
+              <a:buChar char="•"/>
+              <a:defRPr sz="2800" kern="1200">
+                <a:solidFill>
+                  <a:schemeClr val="tx1"/>
+                </a:solidFill>
+                <a:latin typeface="+mn-lt"/>
+                <a:ea typeface="+mn-ea"/>
+                <a:cs typeface="+mn-cs"/>
+              </a:defRPr>
+            </a:lvl1pPr>
+            <a:lvl2pPr marL="685800" indent="-228600" algn="l" defTabSz="914400" rtl="0" eaLnBrk="1" latinLnBrk="0" hangingPunct="1">
+              <a:lnSpc>
+                <a:spcPct val="90000"/>
+              </a:lnSpc>
+              <a:spcBef>
+                <a:spcPts val="500"/>
+              </a:spcBef>
+              <a:buFont typeface="Arial"/>
+              <a:buChar char="•"/>
+              <a:defRPr sz="2400" kern="1200">
+                <a:solidFill>
+                  <a:schemeClr val="tx1"/>
+                </a:solidFill>
+                <a:latin typeface="+mn-lt"/>
+                <a:ea typeface="+mn-ea"/>
+                <a:cs typeface="+mn-cs"/>
+              </a:defRPr>
+            </a:lvl2pPr>
+            <a:lvl3pPr marL="1143000" indent="-228600" algn="l" defTabSz="914400" rtl="0" eaLnBrk="1" latinLnBrk="0" hangingPunct="1">
+              <a:lnSpc>
+                <a:spcPct val="90000"/>
+              </a:lnSpc>
+              <a:spcBef>
+                <a:spcPts val="500"/>
+              </a:spcBef>
+              <a:buFont typeface="Arial"/>
+              <a:buChar char="•"/>
+              <a:defRPr sz="2000" kern="1200">
+                <a:solidFill>
+                  <a:schemeClr val="tx1"/>
+                </a:solidFill>
+                <a:latin typeface="+mn-lt"/>
+                <a:ea typeface="+mn-ea"/>
+                <a:cs typeface="+mn-cs"/>
+              </a:defRPr>
+            </a:lvl3pPr>
+            <a:lvl4pPr marL="1600200" indent="-228600" algn="l" defTabSz="914400" rtl="0" eaLnBrk="1" latinLnBrk="0" hangingPunct="1">
+              <a:lnSpc>
+                <a:spcPct val="90000"/>
+              </a:lnSpc>
+              <a:spcBef>
+                <a:spcPts val="500"/>
+              </a:spcBef>
+              <a:buFont typeface="Arial"/>
+              <a:buChar char="•"/>
+              <a:defRPr sz="1800" kern="1200">
+                <a:solidFill>
+                  <a:schemeClr val="tx1"/>
+                </a:solidFill>
+                <a:latin typeface="+mn-lt"/>
+                <a:ea typeface="+mn-ea"/>
+                <a:cs typeface="+mn-cs"/>
+              </a:defRPr>
+            </a:lvl4pPr>
+            <a:lvl5pPr marL="2057400" indent="-228600" algn="l" defTabSz="914400" rtl="0" eaLnBrk="1" latinLnBrk="0" hangingPunct="1">
+              <a:lnSpc>
+                <a:spcPct val="90000"/>
+              </a:lnSpc>
+              <a:spcBef>
+                <a:spcPts val="500"/>
+              </a:spcBef>
+              <a:buFont typeface="Arial"/>
+              <a:buChar char="•"/>
+              <a:defRPr sz="1800" kern="1200">
+                <a:solidFill>
+                  <a:schemeClr val="tx1"/>
+                </a:solidFill>
+                <a:latin typeface="+mn-lt"/>
+                <a:ea typeface="+mn-ea"/>
+                <a:cs typeface="+mn-cs"/>
+              </a:defRPr>
+            </a:lvl5pPr>
+            <a:lvl6pPr marL="2514600" indent="-228600" algn="l" defTabSz="914400" rtl="0" eaLnBrk="1" latinLnBrk="0" hangingPunct="1">
+              <a:lnSpc>
+                <a:spcPct val="90000"/>
+              </a:lnSpc>
+              <a:spcBef>
+                <a:spcPts val="500"/>
+              </a:spcBef>
+              <a:buFont typeface="Arial"/>
+              <a:buChar char="•"/>
+              <a:defRPr sz="1800" kern="1200">
+                <a:solidFill>
+                  <a:schemeClr val="tx1"/>
+                </a:solidFill>
+                <a:latin typeface="+mn-lt"/>
+                <a:ea typeface="+mn-ea"/>
+                <a:cs typeface="+mn-cs"/>
+              </a:defRPr>
+            </a:lvl6pPr>
+            <a:lvl7pPr marL="2971800" indent="-228600" algn="l" defTabSz="914400" rtl="0" eaLnBrk="1" latinLnBrk="0" hangingPunct="1">
+              <a:lnSpc>
+                <a:spcPct val="90000"/>
+              </a:lnSpc>
+              <a:spcBef>
+                <a:spcPts val="500"/>
+              </a:spcBef>
+              <a:buFont typeface="Arial"/>
+              <a:buChar char="•"/>
+              <a:defRPr sz="1800" kern="1200">
+                <a:solidFill>
+                  <a:schemeClr val="tx1"/>
+                </a:solidFill>
+                <a:latin typeface="+mn-lt"/>
+                <a:ea typeface="+mn-ea"/>
+                <a:cs typeface="+mn-cs"/>
+              </a:defRPr>
+            </a:lvl7pPr>
+            <a:lvl8pPr marL="3429000" indent="-228600" algn="l" defTabSz="914400" rtl="0" eaLnBrk="1" latinLnBrk="0" hangingPunct="1">
+              <a:lnSpc>
+                <a:spcPct val="90000"/>
+              </a:lnSpc>
+              <a:spcBef>
+                <a:spcPts val="500"/>
+              </a:spcBef>
+              <a:buFont typeface="Arial"/>
+              <a:buChar char="•"/>
+              <a:defRPr sz="1800" kern="1200">
+                <a:solidFill>
+                  <a:schemeClr val="tx1"/>
+                </a:solidFill>
+                <a:latin typeface="+mn-lt"/>
+                <a:ea typeface="+mn-ea"/>
+                <a:cs typeface="+mn-cs"/>
+              </a:defRPr>
+            </a:lvl8pPr>
+            <a:lvl9pPr marL="3886200" indent="-228600" algn="l" defTabSz="914400" rtl="0" eaLnBrk="1" latinLnBrk="0" hangingPunct="1">
+              <a:lnSpc>
+                <a:spcPct val="90000"/>
+              </a:lnSpc>
+              <a:spcBef>
+                <a:spcPts val="500"/>
+              </a:spcBef>
+              <a:buFont typeface="Arial"/>
+              <a:buChar char="•"/>
+              <a:defRPr sz="1800" kern="1200">
+                <a:solidFill>
+                  <a:schemeClr val="tx1"/>
+                </a:solidFill>
+                <a:latin typeface="+mn-lt"/>
+                <a:ea typeface="+mn-ea"/>
+                <a:cs typeface="+mn-cs"/>
+              </a:defRPr>
+            </a:lvl9pPr>
+          </a:lstStyle>
+          <a:p>
+            <a:pPr marL="0" indent="0">
+              <a:buNone/>
+            </a:pPr>
+            <a:r>
+              <a:rPr lang="en-CA" sz="2600" dirty="0"/>
+              <a:t>As all the </a:t>
+            </a:r>
+            <a:r>
+              <a:rPr lang="en-CA" sz="2600" dirty="0">
+                <a:solidFill>
+                  <a:srgbClr val="FF40FF"/>
+                </a:solidFill>
+              </a:rPr>
+              <a:t>Heavens</a:t>
+            </a:r>
+            <a:r>
+              <a:rPr lang="en-CA" sz="2600" dirty="0"/>
+              <a:t> were a Bell,</a:t>
+            </a:r>
+          </a:p>
+          <a:p>
+            <a:pPr marL="0" indent="0">
+              <a:buNone/>
+            </a:pPr>
+            <a:r>
+              <a:rPr lang="en-CA" sz="2600" dirty="0"/>
+              <a:t>And </a:t>
+            </a:r>
+            <a:r>
+              <a:rPr lang="en-CA" sz="2600" dirty="0">
+                <a:solidFill>
+                  <a:srgbClr val="00B050"/>
+                </a:solidFill>
+              </a:rPr>
+              <a:t>Being, but an Ear</a:t>
+            </a:r>
+            <a:r>
+              <a:rPr lang="en-CA" sz="2600" dirty="0"/>
+              <a:t>,</a:t>
+            </a:r>
+          </a:p>
+          <a:p>
+            <a:pPr marL="0" indent="0">
+              <a:buNone/>
+            </a:pPr>
+            <a:r>
+              <a:rPr lang="en-CA" sz="2600" dirty="0"/>
+              <a:t>And </a:t>
+            </a:r>
+            <a:r>
+              <a:rPr lang="en-CA" sz="2600" dirty="0">
+                <a:solidFill>
+                  <a:srgbClr val="FF40FF"/>
+                </a:solidFill>
+              </a:rPr>
+              <a:t>I, and Silence</a:t>
+            </a:r>
+            <a:r>
+              <a:rPr lang="en-CA" sz="2600" dirty="0"/>
+              <a:t>, some strange Race,</a:t>
+            </a:r>
+          </a:p>
+          <a:p>
+            <a:pPr marL="0" indent="0">
+              <a:buNone/>
+            </a:pPr>
+            <a:r>
+              <a:rPr lang="en-CA" sz="2600" dirty="0">
+                <a:solidFill>
+                  <a:srgbClr val="FF40FF"/>
+                </a:solidFill>
+              </a:rPr>
+              <a:t>Wrecked, solitary</a:t>
+            </a:r>
+            <a:r>
+              <a:rPr lang="en-CA" sz="2600" dirty="0"/>
+              <a:t>, here -</a:t>
+            </a:r>
+          </a:p>
+          <a:p>
+            <a:pPr marL="0" indent="0">
+              <a:buNone/>
+            </a:pPr>
+            <a:endParaRPr lang="en-CA" sz="2600" dirty="0"/>
+          </a:p>
+          <a:p>
+            <a:pPr marL="0" indent="0">
+              <a:buNone/>
+            </a:pPr>
+            <a:r>
+              <a:rPr lang="en-CA" sz="2600" dirty="0"/>
+              <a:t>And then </a:t>
+            </a:r>
+            <a:r>
+              <a:rPr lang="en-CA" sz="2600" dirty="0">
+                <a:solidFill>
+                  <a:srgbClr val="00B050"/>
+                </a:solidFill>
+              </a:rPr>
+              <a:t>a Plank in Reason, broke</a:t>
+            </a:r>
+            <a:r>
+              <a:rPr lang="en-CA" sz="2600" dirty="0"/>
+              <a:t>,</a:t>
+            </a:r>
+          </a:p>
+          <a:p>
+            <a:pPr marL="0" indent="0">
+              <a:buNone/>
+            </a:pPr>
+            <a:r>
+              <a:rPr lang="en-CA" sz="2600" dirty="0"/>
+              <a:t>And I dropped down, and down -</a:t>
+            </a:r>
+          </a:p>
+          <a:p>
+            <a:pPr marL="0" indent="0">
+              <a:buNone/>
+            </a:pPr>
+            <a:r>
+              <a:rPr lang="en-CA" sz="2600" dirty="0"/>
+              <a:t>And </a:t>
+            </a:r>
+            <a:r>
+              <a:rPr lang="en-CA" sz="2600" dirty="0">
+                <a:solidFill>
+                  <a:srgbClr val="FF40FF"/>
+                </a:solidFill>
+              </a:rPr>
+              <a:t>hit a World, at every plunge</a:t>
+            </a:r>
+            <a:r>
+              <a:rPr lang="en-CA" sz="2600" dirty="0"/>
+              <a:t>,</a:t>
+            </a:r>
+          </a:p>
+          <a:p>
+            <a:pPr marL="0" indent="0">
+              <a:buNone/>
+            </a:pPr>
+            <a:r>
+              <a:rPr lang="en-CA" sz="2600" dirty="0"/>
+              <a:t>And </a:t>
+            </a:r>
+            <a:r>
+              <a:rPr lang="en-CA" sz="2600" dirty="0">
+                <a:solidFill>
+                  <a:srgbClr val="FF40FF"/>
+                </a:solidFill>
+              </a:rPr>
+              <a:t>Finished</a:t>
+            </a:r>
+            <a:r>
+              <a:rPr lang="en-CA" sz="2600" dirty="0"/>
+              <a:t> </a:t>
+            </a:r>
+            <a:r>
+              <a:rPr lang="en-CA" sz="2600" dirty="0">
+                <a:solidFill>
+                  <a:srgbClr val="00B050"/>
+                </a:solidFill>
+              </a:rPr>
+              <a:t>knowing</a:t>
+            </a:r>
+            <a:r>
+              <a:rPr lang="en-CA" sz="2600" dirty="0"/>
+              <a:t> - then -</a:t>
+            </a:r>
+          </a:p>
+        </p:txBody>
+      </p:sp>
+    </p:spTree>
+    <p:extLst>
+      <p:ext uri="{BB962C8B-B14F-4D97-AF65-F5344CB8AC3E}">
+        <p14:creationId xmlns:p14="http://schemas.microsoft.com/office/powerpoint/2010/main" val="466327250"/>
+      </p:ext>
+    </p:extLst>
+  </p:cSld>
+  <p:clrMapOvr>
+    <a:masterClrMapping/>
+  </p:clrMapOvr>
+</p:sld>
+</file>
+
+<file path=ppt/slides/slide37.xml><?xml version="1.0" encoding="utf-8"?>
 <p:sld xmlns:a="http://schemas.openxmlformats.org/drawingml/2006/main" xmlns:r="http://schemas.openxmlformats.org/officeDocument/2006/relationships" xmlns:p="http://schemas.openxmlformats.org/presentationml/2006/main">
   <p:cSld>
     <p:spTree>

</xml_diff>